<commit_message>
changed a few details on PPT
</commit_message>
<xml_diff>
--- a/mockCompany_Presentation.pptx
+++ b/mockCompany_Presentation.pptx
@@ -7896,7 +7896,7 @@
           <a:p>
             <a:fld id="{02AC24A9-CCB6-4F8D-B8DB-C2F3692CFA5A}" type="datetimeFigureOut">
               <a:rPr lang="en-US" smtClean="0"/>
-              <a:t>4/29/2021</a:t>
+              <a:t>2/7/2023</a:t>
             </a:fld>
             <a:endParaRPr lang="en-US" dirty="0"/>
           </a:p>
@@ -8266,7 +8266,7 @@
           <a:p>
             <a:fld id="{02AC24A9-CCB6-4F8D-B8DB-C2F3692CFA5A}" type="datetimeFigureOut">
               <a:rPr lang="en-US" smtClean="0"/>
-              <a:t>4/29/2021</a:t>
+              <a:t>2/7/2023</a:t>
             </a:fld>
             <a:endParaRPr lang="en-US"/>
           </a:p>
@@ -8475,7 +8475,7 @@
           <a:p>
             <a:fld id="{02AC24A9-CCB6-4F8D-B8DB-C2F3692CFA5A}" type="datetimeFigureOut">
               <a:rPr lang="en-US" smtClean="0"/>
-              <a:t>4/29/2021</a:t>
+              <a:t>2/7/2023</a:t>
             </a:fld>
             <a:endParaRPr lang="en-US"/>
           </a:p>
@@ -8945,7 +8945,7 @@
           <a:p>
             <a:fld id="{02AC24A9-CCB6-4F8D-B8DB-C2F3692CFA5A}" type="datetimeFigureOut">
               <a:rPr lang="en-US" smtClean="0"/>
-              <a:t>4/29/2021</a:t>
+              <a:t>2/7/2023</a:t>
             </a:fld>
             <a:endParaRPr lang="en-US"/>
           </a:p>
@@ -9399,7 +9399,7 @@
           <a:p>
             <a:fld id="{02AC24A9-CCB6-4F8D-B8DB-C2F3692CFA5A}" type="datetimeFigureOut">
               <a:rPr lang="en-US" smtClean="0"/>
-              <a:t>4/29/2021</a:t>
+              <a:t>2/7/2023</a:t>
             </a:fld>
             <a:endParaRPr lang="en-US"/>
           </a:p>
@@ -9931,7 +9931,7 @@
           <a:p>
             <a:fld id="{02AC24A9-CCB6-4F8D-B8DB-C2F3692CFA5A}" type="datetimeFigureOut">
               <a:rPr lang="en-US" smtClean="0"/>
-              <a:t>4/29/2021</a:t>
+              <a:t>2/7/2023</a:t>
             </a:fld>
             <a:endParaRPr lang="en-US"/>
           </a:p>
@@ -10630,7 +10630,7 @@
           <a:p>
             <a:fld id="{02AC24A9-CCB6-4F8D-B8DB-C2F3692CFA5A}" type="datetimeFigureOut">
               <a:rPr lang="en-US" smtClean="0"/>
-              <a:t>4/29/2021</a:t>
+              <a:t>2/7/2023</a:t>
             </a:fld>
             <a:endParaRPr lang="en-US"/>
           </a:p>
@@ -10959,7 +10959,7 @@
           <a:p>
             <a:fld id="{02AC24A9-CCB6-4F8D-B8DB-C2F3692CFA5A}" type="datetimeFigureOut">
               <a:rPr lang="en-US" smtClean="0"/>
-              <a:t>4/29/2021</a:t>
+              <a:t>2/7/2023</a:t>
             </a:fld>
             <a:endParaRPr lang="en-US"/>
           </a:p>
@@ -11072,7 +11072,7 @@
           <a:p>
             <a:fld id="{02AC24A9-CCB6-4F8D-B8DB-C2F3692CFA5A}" type="datetimeFigureOut">
               <a:rPr lang="en-US" smtClean="0"/>
-              <a:t>4/29/2021</a:t>
+              <a:t>2/7/2023</a:t>
             </a:fld>
             <a:endParaRPr lang="en-US"/>
           </a:p>
@@ -11567,7 +11567,7 @@
           <a:p>
             <a:fld id="{02AC24A9-CCB6-4F8D-B8DB-C2F3692CFA5A}" type="datetimeFigureOut">
               <a:rPr lang="en-US" smtClean="0"/>
-              <a:t>4/29/2021</a:t>
+              <a:t>2/7/2023</a:t>
             </a:fld>
             <a:endParaRPr lang="en-US" dirty="0"/>
           </a:p>
@@ -12044,7 +12044,7 @@
           <a:p>
             <a:fld id="{02AC24A9-CCB6-4F8D-B8DB-C2F3692CFA5A}" type="datetimeFigureOut">
               <a:rPr lang="en-US" smtClean="0"/>
-              <a:t>4/29/2021</a:t>
+              <a:t>2/7/2023</a:t>
             </a:fld>
             <a:endParaRPr lang="en-US"/>
           </a:p>
@@ -12287,7 +12287,7 @@
           <a:p>
             <a:fld id="{02AC24A9-CCB6-4F8D-B8DB-C2F3692CFA5A}" type="datetimeFigureOut">
               <a:rPr lang="en-US" smtClean="0"/>
-              <a:t>4/29/2021</a:t>
+              <a:t>2/7/2023</a:t>
             </a:fld>
             <a:endParaRPr lang="en-US"/>
           </a:p>
@@ -15593,12 +15593,8 @@
           </a:p>
           <a:p>
             <a:r>
-              <a:rPr lang="en-US" sz="1700" dirty="0" err="1"/>
-              <a:t>Otliers</a:t>
-            </a:r>
-            <a:r>
               <a:rPr lang="en-US" sz="1700" dirty="0"/>
-              <a:t> would be worth talking to </a:t>
+              <a:t>Outliers accounts would be worth directly engaging with </a:t>
             </a:r>
           </a:p>
         </p:txBody>
@@ -16471,8 +16467,8 @@
         </p:nvSpPr>
         <p:spPr>
           <a:xfrm>
-            <a:off x="1115568" y="2167992"/>
-            <a:ext cx="10168128" cy="3694176"/>
+            <a:off x="1115568" y="2002971"/>
+            <a:ext cx="10168128" cy="3859197"/>
           </a:xfrm>
         </p:spPr>
         <p:txBody>
@@ -16500,7 +16496,7 @@
             <a:pPr lvl="1"/>
             <a:r>
               <a:rPr lang="en-US" sz="1400" dirty="0"/>
-              <a:t>Track inactive users (59%) and remind them to add clients</a:t>
+              <a:t>Track inactive users (59%) and explore viability of a reminder to add clients (Call to action)</a:t>
             </a:r>
           </a:p>
           <a:p>
@@ -16516,14 +16512,14 @@
             <a:pPr lvl="1"/>
             <a:r>
               <a:rPr lang="en-US" sz="1400" dirty="0"/>
-              <a:t>Focus efforts to increase engagement to the first couple of days of account creation</a:t>
+              <a:t>Focus efforts to increase engagement within the first couple of days of account creation</a:t>
             </a:r>
           </a:p>
           <a:p>
             <a:pPr lvl="1"/>
             <a:r>
               <a:rPr lang="en-US" sz="1400" dirty="0"/>
-              <a:t>Campaign to encourage those with 5+ clients (top user) to try Bravado Marketplace</a:t>
+              <a:t>Campaign to encourage those with 5+ clients (top user) to try Product Y (another offering)</a:t>
             </a:r>
           </a:p>
           <a:p>
@@ -16538,7 +16534,7 @@
           <a:p>
             <a:r>
               <a:rPr lang="en-US" sz="1400" dirty="0"/>
-              <a:t>Explore cyclical trends more in depth (weekday, time of day, etc.)</a:t>
+              <a:t>Explore trends more in depth (day, week, month). Potentially implement forecasting methods in the future</a:t>
             </a:r>
           </a:p>
           <a:p>
@@ -16551,14 +16547,14 @@
             <a:pPr lvl="1"/>
             <a:r>
               <a:rPr lang="en-US" sz="1400" dirty="0"/>
-              <a:t>Application Usage data</a:t>
+              <a:t>Application use data</a:t>
             </a:r>
           </a:p>
           <a:p>
             <a:pPr lvl="1"/>
             <a:r>
               <a:rPr lang="en-US" sz="1400" dirty="0"/>
-              <a:t>Client specifics and user demographics</a:t>
+              <a:t>Client account details and user demographics</a:t>
             </a:r>
           </a:p>
           <a:p>
@@ -16571,7 +16567,7 @@
           <a:p>
             <a:r>
               <a:rPr lang="en-US" sz="1400" dirty="0"/>
-              <a:t>Use new data to drive product changes and feature adds</a:t>
+              <a:t>Use the additional data to drive product changes and feature adds</a:t>
             </a:r>
           </a:p>
         </p:txBody>
@@ -16675,7 +16671,7 @@
           <a:p>
             <a:r>
               <a:rPr lang="en-US" dirty="0"/>
-              <a:t>Trend information about new users and client additions should be easy to access and scalable.</a:t>
+              <a:t>All data for the previous analyses should be easy to access and scalable, enabling the company to generate insights more efficiently.</a:t>
             </a:r>
           </a:p>
           <a:p>
@@ -16705,7 +16701,7 @@
           <a:p>
             <a:r>
               <a:rPr lang="en-US" dirty="0"/>
-              <a:t>Data layer will take in parameters (range, periods, etc.) and return aggregated data along with a set of pre-determined KPI’s</a:t>
+              <a:t>Data layer will take in parameters (range, time periods, activity details, etc.) and return aggregated data along with a set of pre-determined KPI’s</a:t>
             </a:r>
           </a:p>
           <a:p>

</xml_diff>